<commit_message>
note updated: model language definition
</commit_message>
<xml_diff>
--- a/sjs/note.pptx
+++ b/sjs/note.pptx
@@ -3401,7 +3401,7 @@
         <p:spPr>
           <a:xfrm>
             <a:off x="650706" y="1826993"/>
-            <a:ext cx="2550350" cy="3046988"/>
+            <a:ext cx="2550350" cy="3539430"/>
           </a:xfrm>
           <a:prstGeom prst="rect">
             <a:avLst/>
@@ -3611,6 +3611,85 @@
                 <a:latin typeface="Consolas"/>
                 <a:cs typeface="Consolas"/>
               </a:rPr>
+              <a:t> </a:t>
+            </a:r>
+            <a:r>
+              <a:rPr lang="en-US" sz="1600" dirty="0" smtClean="0">
+                <a:latin typeface="Consolas"/>
+                <a:cs typeface="Consolas"/>
+              </a:rPr>
+              <a:t>S</a:t>
+            </a:r>
+          </a:p>
+          <a:p>
+            <a:r>
+              <a:rPr lang="en-US" sz="1600" dirty="0">
+                <a:latin typeface="Consolas"/>
+                <a:cs typeface="Consolas"/>
+              </a:rPr>
+              <a:t>	</a:t>
+            </a:r>
+            <a:r>
+              <a:rPr lang="en-US" sz="1600" dirty="0" smtClean="0">
+                <a:latin typeface="Consolas"/>
+                <a:cs typeface="Consolas"/>
+              </a:rPr>
+              <a:t>| </a:t>
+            </a:r>
+            <a:r>
+              <a:rPr lang="en-US" sz="1600" b="1" dirty="0" smtClean="0">
+                <a:latin typeface="Consolas"/>
+                <a:cs typeface="Consolas"/>
+              </a:rPr>
+              <a:t>for(</a:t>
+            </a:r>
+            <a:r>
+              <a:rPr lang="en-US" sz="1600" dirty="0" smtClean="0">
+                <a:latin typeface="Consolas"/>
+                <a:cs typeface="Consolas"/>
+              </a:rPr>
+              <a:t>E</a:t>
+            </a:r>
+            <a:r>
+              <a:rPr lang="en-US" sz="1600" b="1" dirty="0" smtClean="0">
+                <a:latin typeface="Consolas"/>
+                <a:cs typeface="Consolas"/>
+              </a:rPr>
+              <a:t>;</a:t>
+            </a:r>
+            <a:r>
+              <a:rPr lang="en-US" sz="1600" dirty="0" smtClean="0">
+                <a:latin typeface="Consolas"/>
+                <a:cs typeface="Consolas"/>
+              </a:rPr>
+              <a:t>E</a:t>
+            </a:r>
+            <a:r>
+              <a:rPr lang="en-US" sz="1600" b="1" dirty="0" smtClean="0">
+                <a:latin typeface="Consolas"/>
+                <a:cs typeface="Consolas"/>
+              </a:rPr>
+              <a:t>;</a:t>
+            </a:r>
+            <a:r>
+              <a:rPr lang="en-US" sz="1600" dirty="0" smtClean="0">
+                <a:latin typeface="Consolas"/>
+                <a:cs typeface="Consolas"/>
+              </a:rPr>
+              <a:t>E</a:t>
+            </a:r>
+            <a:r>
+              <a:rPr lang="en-US" sz="1600" b="1" dirty="0" smtClean="0">
+                <a:latin typeface="Consolas"/>
+                <a:cs typeface="Consolas"/>
+              </a:rPr>
+              <a:t>)</a:t>
+            </a:r>
+            <a:r>
+              <a:rPr lang="en-US" sz="1600" dirty="0" smtClean="0">
+                <a:latin typeface="Consolas"/>
+                <a:cs typeface="Consolas"/>
+              </a:rPr>
               <a:t> S</a:t>
             </a:r>
           </a:p>
@@ -3634,28 +3713,28 @@
                 <a:latin typeface="Consolas"/>
                 <a:cs typeface="Consolas"/>
               </a:rPr>
-              <a:t>while</a:t>
+              <a:t>for(</a:t>
             </a:r>
             <a:r>
               <a:rPr lang="en-US" sz="1600" dirty="0" smtClean="0">
                 <a:latin typeface="Consolas"/>
                 <a:cs typeface="Consolas"/>
               </a:rPr>
-              <a:t> </a:t>
+              <a:t>X </a:t>
             </a:r>
             <a:r>
               <a:rPr lang="en-US" sz="1600" b="1" dirty="0" smtClean="0">
                 <a:latin typeface="Consolas"/>
                 <a:cs typeface="Consolas"/>
               </a:rPr>
-              <a:t>(</a:t>
+              <a:t>in</a:t>
             </a:r>
             <a:r>
               <a:rPr lang="en-US" sz="1600" dirty="0" smtClean="0">
                 <a:latin typeface="Consolas"/>
                 <a:cs typeface="Consolas"/>
               </a:rPr>
-              <a:t>X</a:t>
+              <a:t> E</a:t>
             </a:r>
             <a:r>
               <a:rPr lang="en-US" sz="1600" b="1" dirty="0" smtClean="0">
@@ -3671,114 +3750,172 @@
               </a:rPr>
               <a:t> S</a:t>
             </a:r>
-          </a:p>
-          <a:p>
-            <a:r>
-              <a:rPr lang="en-US" sz="1600" dirty="0">
-                <a:latin typeface="Consolas"/>
-                <a:cs typeface="Consolas"/>
-              </a:rPr>
-              <a:t>	</a:t>
-            </a:r>
-            <a:r>
-              <a:rPr lang="en-US" sz="1600" dirty="0" smtClean="0">
-                <a:latin typeface="Consolas"/>
-                <a:cs typeface="Consolas"/>
-              </a:rPr>
-              <a:t>| </a:t>
-            </a:r>
-            <a:r>
-              <a:rPr lang="en-US" sz="1600" b="1" dirty="0" smtClean="0">
-                <a:latin typeface="Consolas"/>
-                <a:cs typeface="Consolas"/>
-              </a:rPr>
-              <a:t>break</a:t>
-            </a:r>
-            <a:r>
-              <a:rPr lang="en-US" sz="1600" dirty="0" smtClean="0">
-                <a:latin typeface="Consolas"/>
-                <a:cs typeface="Consolas"/>
-              </a:rPr>
-              <a:t> L</a:t>
-            </a:r>
-            <a:r>
-              <a:rPr lang="en-US" sz="1600" b="1" dirty="0" smtClean="0">
-                <a:latin typeface="Consolas"/>
-                <a:cs typeface="Consolas"/>
-              </a:rPr>
-              <a:t>;</a:t>
-            </a:r>
-          </a:p>
-          <a:p>
-            <a:r>
-              <a:rPr lang="en-US" sz="1600" dirty="0">
-                <a:latin typeface="Consolas"/>
-                <a:cs typeface="Consolas"/>
-              </a:rPr>
-              <a:t>	</a:t>
-            </a:r>
-            <a:r>
-              <a:rPr lang="en-US" sz="1600" dirty="0" smtClean="0">
-                <a:latin typeface="Consolas"/>
-                <a:cs typeface="Consolas"/>
-              </a:rPr>
-              <a:t>| </a:t>
-            </a:r>
-            <a:r>
-              <a:rPr lang="en-US" sz="1600" b="1" dirty="0" smtClean="0">
-                <a:latin typeface="Consolas"/>
-                <a:cs typeface="Consolas"/>
-              </a:rPr>
-              <a:t>continue</a:t>
-            </a:r>
-            <a:r>
-              <a:rPr lang="en-US" sz="1600" dirty="0" smtClean="0">
-                <a:latin typeface="Consolas"/>
-                <a:cs typeface="Consolas"/>
-              </a:rPr>
-              <a:t> L</a:t>
-            </a:r>
-            <a:r>
-              <a:rPr lang="en-US" sz="1600" b="1" dirty="0" smtClean="0">
-                <a:latin typeface="Consolas"/>
-                <a:cs typeface="Consolas"/>
-              </a:rPr>
-              <a:t>;</a:t>
-            </a:r>
-          </a:p>
-          <a:p>
-            <a:r>
-              <a:rPr lang="en-US" sz="1600" dirty="0" smtClean="0">
-                <a:latin typeface="Consolas"/>
-                <a:cs typeface="Consolas"/>
-              </a:rPr>
-              <a:t>	| </a:t>
-            </a:r>
-            <a:r>
-              <a:rPr lang="en-US" sz="1600" b="1" dirty="0" smtClean="0">
-                <a:latin typeface="Consolas"/>
-                <a:cs typeface="Consolas"/>
-              </a:rPr>
-              <a:t>{</a:t>
-            </a:r>
-            <a:r>
-              <a:rPr lang="en-US" sz="1600" dirty="0" smtClean="0">
-                <a:latin typeface="Consolas"/>
-                <a:cs typeface="Consolas"/>
-              </a:rPr>
-              <a:t> S* </a:t>
-            </a:r>
-            <a:r>
-              <a:rPr lang="en-US" sz="1600" b="1" dirty="0" smtClean="0">
-                <a:latin typeface="Consolas"/>
-                <a:cs typeface="Consolas"/>
-              </a:rPr>
-              <a:t>}</a:t>
-            </a:r>
-            <a:endParaRPr lang="en-US" sz="1600" b="1" dirty="0" smtClean="0">
+            <a:endParaRPr lang="en-US" sz="1600" dirty="0" smtClean="0">
               <a:latin typeface="Consolas"/>
               <a:cs typeface="Consolas"/>
             </a:endParaRPr>
+          </a:p>
+          <a:p>
+            <a:r>
+              <a:rPr lang="en-US" sz="1600" dirty="0">
+                <a:latin typeface="Consolas"/>
+                <a:cs typeface="Consolas"/>
+              </a:rPr>
+              <a:t>	</a:t>
+            </a:r>
+            <a:r>
+              <a:rPr lang="en-US" sz="1600" dirty="0" smtClean="0">
+                <a:latin typeface="Consolas"/>
+                <a:cs typeface="Consolas"/>
+              </a:rPr>
+              <a:t>| </a:t>
+            </a:r>
+            <a:r>
+              <a:rPr lang="en-US" sz="1600" b="1" dirty="0" smtClean="0">
+                <a:latin typeface="Consolas"/>
+                <a:cs typeface="Consolas"/>
+              </a:rPr>
+              <a:t>while</a:t>
+            </a:r>
+            <a:r>
+              <a:rPr lang="en-US" sz="1600" dirty="0" smtClean="0">
+                <a:latin typeface="Consolas"/>
+                <a:cs typeface="Consolas"/>
+              </a:rPr>
+              <a:t> </a:t>
+            </a:r>
+            <a:r>
+              <a:rPr lang="en-US" sz="1600" b="1" dirty="0" smtClean="0">
+                <a:latin typeface="Consolas"/>
+                <a:cs typeface="Consolas"/>
+              </a:rPr>
+              <a:t>(</a:t>
+            </a:r>
+            <a:r>
+              <a:rPr lang="en-US" sz="1600" dirty="0" smtClean="0">
+                <a:latin typeface="Consolas"/>
+                <a:cs typeface="Consolas"/>
+              </a:rPr>
+              <a:t>X</a:t>
+            </a:r>
+            <a:r>
+              <a:rPr lang="en-US" sz="1600" b="1" dirty="0" smtClean="0">
+                <a:latin typeface="Consolas"/>
+                <a:cs typeface="Consolas"/>
+              </a:rPr>
+              <a:t>)</a:t>
+            </a:r>
+            <a:r>
+              <a:rPr lang="en-US" sz="1600" dirty="0" smtClean="0">
+                <a:latin typeface="Consolas"/>
+                <a:cs typeface="Consolas"/>
+              </a:rPr>
+              <a:t> S</a:t>
+            </a:r>
+          </a:p>
+          <a:p>
+            <a:r>
+              <a:rPr lang="en-US" sz="1600" dirty="0">
+                <a:latin typeface="Consolas"/>
+                <a:cs typeface="Consolas"/>
+              </a:rPr>
+              <a:t>	</a:t>
+            </a:r>
+            <a:r>
+              <a:rPr lang="en-US" sz="1600" dirty="0" smtClean="0">
+                <a:latin typeface="Consolas"/>
+                <a:cs typeface="Consolas"/>
+              </a:rPr>
+              <a:t>| </a:t>
+            </a:r>
+            <a:r>
+              <a:rPr lang="en-US" sz="1600" b="1" dirty="0" smtClean="0">
+                <a:latin typeface="Consolas"/>
+                <a:cs typeface="Consolas"/>
+              </a:rPr>
+              <a:t>break</a:t>
+            </a:r>
+            <a:r>
+              <a:rPr lang="en-US" sz="1600" dirty="0" smtClean="0">
+                <a:latin typeface="Consolas"/>
+                <a:cs typeface="Consolas"/>
+              </a:rPr>
+              <a:t> L</a:t>
+            </a:r>
+            <a:r>
+              <a:rPr lang="en-US" sz="1600" b="1" dirty="0" smtClean="0">
+                <a:latin typeface="Consolas"/>
+                <a:cs typeface="Consolas"/>
+              </a:rPr>
+              <a:t>;</a:t>
+            </a:r>
+          </a:p>
+          <a:p>
+            <a:r>
+              <a:rPr lang="en-US" sz="1600" dirty="0">
+                <a:latin typeface="Consolas"/>
+                <a:cs typeface="Consolas"/>
+              </a:rPr>
+              <a:t>	</a:t>
+            </a:r>
+            <a:r>
+              <a:rPr lang="en-US" sz="1600" dirty="0" smtClean="0">
+                <a:latin typeface="Consolas"/>
+                <a:cs typeface="Consolas"/>
+              </a:rPr>
+              <a:t>| </a:t>
+            </a:r>
+            <a:r>
+              <a:rPr lang="en-US" sz="1600" b="1" dirty="0" smtClean="0">
+                <a:latin typeface="Consolas"/>
+                <a:cs typeface="Consolas"/>
+              </a:rPr>
+              <a:t>continue</a:t>
+            </a:r>
+            <a:r>
+              <a:rPr lang="en-US" sz="1600" dirty="0" smtClean="0">
+                <a:latin typeface="Consolas"/>
+                <a:cs typeface="Consolas"/>
+              </a:rPr>
+              <a:t> L</a:t>
+            </a:r>
+            <a:r>
+              <a:rPr lang="en-US" sz="1600" b="1" dirty="0" smtClean="0">
+                <a:latin typeface="Consolas"/>
+                <a:cs typeface="Consolas"/>
+              </a:rPr>
+              <a:t>;</a:t>
+            </a:r>
+          </a:p>
+          <a:p>
+            <a:r>
+              <a:rPr lang="en-US" sz="1600" dirty="0" smtClean="0">
+                <a:latin typeface="Consolas"/>
+                <a:cs typeface="Consolas"/>
+              </a:rPr>
+              <a:t>	| </a:t>
+            </a:r>
+            <a:r>
+              <a:rPr lang="en-US" sz="1600" b="1" dirty="0" smtClean="0">
+                <a:latin typeface="Consolas"/>
+                <a:cs typeface="Consolas"/>
+              </a:rPr>
+              <a:t>{</a:t>
+            </a:r>
+            <a:r>
+              <a:rPr lang="en-US" sz="1600" dirty="0" smtClean="0">
+                <a:latin typeface="Consolas"/>
+                <a:cs typeface="Consolas"/>
+              </a:rPr>
+              <a:t> S* </a:t>
+            </a:r>
+            <a:r>
+              <a:rPr lang="en-US" sz="1600" b="1" dirty="0" smtClean="0">
+                <a:latin typeface="Consolas"/>
+                <a:cs typeface="Consolas"/>
+              </a:rPr>
+              <a:t>}</a:t>
+            </a:r>
           </a:p>
           <a:p>
             <a:r>
@@ -5799,10 +5936,6 @@
               </a:rPr>
               <a:t>“SJS is a C like subset of JS with good part of JS.”</a:t>
             </a:r>
-            <a:endParaRPr lang="en-US" sz="2000" b="1" dirty="0" smtClean="0">
-              <a:latin typeface="Comic Sans MS"/>
-              <a:cs typeface="Comic Sans MS"/>
-            </a:endParaRPr>
           </a:p>
         </p:txBody>
       </p:sp>
@@ -5943,10 +6076,6 @@
               </a:rPr>
               <a:t>“Amount of necessary type hint should be minimal”</a:t>
             </a:r>
-            <a:endParaRPr lang="en-US" sz="2000" b="1" dirty="0" smtClean="0">
-              <a:latin typeface="Comic Sans MS"/>
-              <a:cs typeface="Comic Sans MS"/>
-            </a:endParaRPr>
           </a:p>
         </p:txBody>
       </p:sp>

</xml_diff>